<commit_message>
Update System Overview to include comm from battery to application sofwtare
</commit_message>
<xml_diff>
--- a/system_overview/SystemOverview.pptx
+++ b/system_overview/SystemOverview.pptx
@@ -197,7 +197,7 @@
           <a:p>
             <a:fld id="{B7678407-DB36-40D4-A9A8-240E7D76D023}" type="datetimeFigureOut">
               <a:rPr lang="en-GB" smtClean="0"/>
-              <a:t>23/11/2020</a:t>
+              <a:t>06/12/2020</a:t>
             </a:fld>
             <a:endParaRPr lang="en-GB"/>
           </a:p>
@@ -680,7 +680,7 @@
           <a:p>
             <a:fld id="{53227B52-D19E-494A-ACCE-1D7F88203449}" type="datetimeFigureOut">
               <a:rPr lang="en-GB" smtClean="0"/>
-              <a:t>23/11/2020</a:t>
+              <a:t>06/12/2020</a:t>
             </a:fld>
             <a:endParaRPr lang="en-GB"/>
           </a:p>
@@ -850,7 +850,7 @@
           <a:p>
             <a:fld id="{53227B52-D19E-494A-ACCE-1D7F88203449}" type="datetimeFigureOut">
               <a:rPr lang="en-GB" smtClean="0"/>
-              <a:t>23/11/2020</a:t>
+              <a:t>06/12/2020</a:t>
             </a:fld>
             <a:endParaRPr lang="en-GB"/>
           </a:p>
@@ -1030,7 +1030,7 @@
           <a:p>
             <a:fld id="{53227B52-D19E-494A-ACCE-1D7F88203449}" type="datetimeFigureOut">
               <a:rPr lang="en-GB" smtClean="0"/>
-              <a:t>23/11/2020</a:t>
+              <a:t>06/12/2020</a:t>
             </a:fld>
             <a:endParaRPr lang="en-GB"/>
           </a:p>
@@ -1200,7 +1200,7 @@
           <a:p>
             <a:fld id="{53227B52-D19E-494A-ACCE-1D7F88203449}" type="datetimeFigureOut">
               <a:rPr lang="en-GB" smtClean="0"/>
-              <a:t>23/11/2020</a:t>
+              <a:t>06/12/2020</a:t>
             </a:fld>
             <a:endParaRPr lang="en-GB"/>
           </a:p>
@@ -1444,7 +1444,7 @@
           <a:p>
             <a:fld id="{53227B52-D19E-494A-ACCE-1D7F88203449}" type="datetimeFigureOut">
               <a:rPr lang="en-GB" smtClean="0"/>
-              <a:t>23/11/2020</a:t>
+              <a:t>06/12/2020</a:t>
             </a:fld>
             <a:endParaRPr lang="en-GB"/>
           </a:p>
@@ -1676,7 +1676,7 @@
           <a:p>
             <a:fld id="{53227B52-D19E-494A-ACCE-1D7F88203449}" type="datetimeFigureOut">
               <a:rPr lang="en-GB" smtClean="0"/>
-              <a:t>23/11/2020</a:t>
+              <a:t>06/12/2020</a:t>
             </a:fld>
             <a:endParaRPr lang="en-GB"/>
           </a:p>
@@ -2043,7 +2043,7 @@
           <a:p>
             <a:fld id="{53227B52-D19E-494A-ACCE-1D7F88203449}" type="datetimeFigureOut">
               <a:rPr lang="en-GB" smtClean="0"/>
-              <a:t>23/11/2020</a:t>
+              <a:t>06/12/2020</a:t>
             </a:fld>
             <a:endParaRPr lang="en-GB"/>
           </a:p>
@@ -2161,7 +2161,7 @@
           <a:p>
             <a:fld id="{53227B52-D19E-494A-ACCE-1D7F88203449}" type="datetimeFigureOut">
               <a:rPr lang="en-GB" smtClean="0"/>
-              <a:t>23/11/2020</a:t>
+              <a:t>06/12/2020</a:t>
             </a:fld>
             <a:endParaRPr lang="en-GB"/>
           </a:p>
@@ -2256,7 +2256,7 @@
           <a:p>
             <a:fld id="{53227B52-D19E-494A-ACCE-1D7F88203449}" type="datetimeFigureOut">
               <a:rPr lang="en-GB" smtClean="0"/>
-              <a:t>23/11/2020</a:t>
+              <a:t>06/12/2020</a:t>
             </a:fld>
             <a:endParaRPr lang="en-GB"/>
           </a:p>
@@ -2533,7 +2533,7 @@
           <a:p>
             <a:fld id="{53227B52-D19E-494A-ACCE-1D7F88203449}" type="datetimeFigureOut">
               <a:rPr lang="en-GB" smtClean="0"/>
-              <a:t>23/11/2020</a:t>
+              <a:t>06/12/2020</a:t>
             </a:fld>
             <a:endParaRPr lang="en-GB"/>
           </a:p>
@@ -2790,7 +2790,7 @@
           <a:p>
             <a:fld id="{53227B52-D19E-494A-ACCE-1D7F88203449}" type="datetimeFigureOut">
               <a:rPr lang="en-GB" smtClean="0"/>
-              <a:t>23/11/2020</a:t>
+              <a:t>06/12/2020</a:t>
             </a:fld>
             <a:endParaRPr lang="en-GB"/>
           </a:p>
@@ -3003,7 +3003,7 @@
           <a:p>
             <a:fld id="{53227B52-D19E-494A-ACCE-1D7F88203449}" type="datetimeFigureOut">
               <a:rPr lang="en-GB" smtClean="0"/>
-              <a:t>23/11/2020</a:t>
+              <a:t>06/12/2020</a:t>
             </a:fld>
             <a:endParaRPr lang="en-GB"/>
           </a:p>
@@ -3422,8 +3422,8 @@
         </p:nvSpPr>
         <p:spPr>
           <a:xfrm>
-            <a:off x="2003912" y="10438253"/>
-            <a:ext cx="14598748" cy="11314531"/>
+            <a:off x="2003912" y="10438254"/>
+            <a:ext cx="14598748" cy="10713652"/>
           </a:xfrm>
           <a:prstGeom prst="rect">
             <a:avLst/>
@@ -3624,7 +3624,7 @@
         </p:nvSpPr>
         <p:spPr>
           <a:xfrm>
-            <a:off x="10222705" y="17771293"/>
+            <a:off x="9050928" y="17892270"/>
             <a:ext cx="2620494" cy="2251530"/>
           </a:xfrm>
           <a:prstGeom prst="rect">
@@ -3693,7 +3693,7 @@
         </p:nvSpPr>
         <p:spPr>
           <a:xfrm>
-            <a:off x="10566387" y="18375444"/>
+            <a:off x="9394610" y="18496421"/>
             <a:ext cx="1892300" cy="1378856"/>
           </a:xfrm>
           <a:prstGeom prst="rect">
@@ -3754,7 +3754,7 @@
         </p:nvSpPr>
         <p:spPr>
           <a:xfrm>
-            <a:off x="13268078" y="17741169"/>
+            <a:off x="11979515" y="17880591"/>
             <a:ext cx="2648633" cy="2251530"/>
           </a:xfrm>
           <a:prstGeom prst="rect">
@@ -3823,7 +3823,7 @@
         </p:nvSpPr>
         <p:spPr>
           <a:xfrm>
-            <a:off x="13651092" y="18313043"/>
+            <a:off x="12362529" y="18452465"/>
             <a:ext cx="1892300" cy="1378856"/>
           </a:xfrm>
           <a:prstGeom prst="rect">
@@ -3884,8 +3884,8 @@
         </p:nvSpPr>
         <p:spPr>
           <a:xfrm>
-            <a:off x="13046470" y="22291526"/>
-            <a:ext cx="3101545" cy="1686736"/>
+            <a:off x="17300721" y="18298525"/>
+            <a:ext cx="3893470" cy="1686736"/>
           </a:xfrm>
           <a:prstGeom prst="rect">
             <a:avLst/>
@@ -4003,15 +4003,15 @@
           </p:cNvPr>
           <p:cNvCxnSpPr>
             <a:cxnSpLocks/>
-            <a:stCxn id="42" idx="0"/>
-            <a:endCxn id="38" idx="2"/>
+            <a:stCxn id="42" idx="1"/>
+            <a:endCxn id="38" idx="3"/>
           </p:cNvCxnSpPr>
           <p:nvPr/>
         </p:nvCxnSpPr>
         <p:spPr>
-          <a:xfrm flipH="1" flipV="1">
-            <a:off x="14597242" y="19691899"/>
-            <a:ext cx="1" cy="2599627"/>
+          <a:xfrm flipH="1">
+            <a:off x="14254829" y="19141893"/>
+            <a:ext cx="3045892" cy="0"/>
           </a:xfrm>
           <a:prstGeom prst="straightConnector1">
             <a:avLst/>
@@ -4107,51 +4107,6 @@
           </a:p>
         </p:txBody>
       </p:sp>
-      <p:cxnSp>
-        <p:nvCxnSpPr>
-          <p:cNvPr id="59" name="Straight Arrow Connector 58">
-            <a:extLst>
-              <a:ext uri="{FF2B5EF4-FFF2-40B4-BE49-F238E27FC236}">
-                <a16:creationId xmlns:a16="http://schemas.microsoft.com/office/drawing/2014/main" id="{53B9A408-0067-4DD0-93EE-B5C4D63B32B4}"/>
-              </a:ext>
-            </a:extLst>
-          </p:cNvPr>
-          <p:cNvCxnSpPr>
-            <a:cxnSpLocks/>
-            <a:stCxn id="20" idx="0"/>
-          </p:cNvCxnSpPr>
-          <p:nvPr/>
-        </p:nvCxnSpPr>
-        <p:spPr>
-          <a:xfrm flipH="1" flipV="1">
-            <a:off x="7636050" y="16287747"/>
-            <a:ext cx="6313" cy="1483546"/>
-          </a:xfrm>
-          <a:prstGeom prst="straightConnector1">
-            <a:avLst/>
-          </a:prstGeom>
-          <a:ln w="76200">
-            <a:solidFill>
-              <a:schemeClr val="tx1"/>
-            </a:solidFill>
-            <a:tailEnd type="triangle"/>
-          </a:ln>
-        </p:spPr>
-        <p:style>
-          <a:lnRef idx="1">
-            <a:schemeClr val="accent1"/>
-          </a:lnRef>
-          <a:fillRef idx="0">
-            <a:schemeClr val="accent1"/>
-          </a:fillRef>
-          <a:effectRef idx="0">
-            <a:schemeClr val="accent1"/>
-          </a:effectRef>
-          <a:fontRef idx="minor">
-            <a:schemeClr val="tx1"/>
-          </a:fontRef>
-        </p:style>
-      </p:cxnSp>
       <p:grpSp>
         <p:nvGrpSpPr>
           <p:cNvPr id="69" name="Group 68">
@@ -4166,10 +4121,10 @@
         </p:nvGrpSpPr>
         <p:grpSpPr>
           <a:xfrm>
-            <a:off x="5417232" y="17771293"/>
-            <a:ext cx="4450262" cy="3526969"/>
-            <a:chOff x="12275232" y="18868573"/>
-            <a:chExt cx="4450262" cy="3526969"/>
+            <a:off x="2340255" y="17888460"/>
+            <a:ext cx="6408011" cy="2783507"/>
+            <a:chOff x="9158572" y="18990627"/>
+            <a:chExt cx="6408011" cy="2783507"/>
           </a:xfrm>
         </p:grpSpPr>
         <p:sp>
@@ -4186,8 +4141,8 @@
           </p:nvSpPr>
           <p:spPr>
             <a:xfrm>
-              <a:off x="12275232" y="18868573"/>
-              <a:ext cx="4450262" cy="3526969"/>
+              <a:off x="9158572" y="18990627"/>
+              <a:ext cx="6408011" cy="2783507"/>
             </a:xfrm>
             <a:prstGeom prst="rect">
               <a:avLst/>
@@ -4255,7 +4210,7 @@
           </p:nvSpPr>
           <p:spPr>
             <a:xfrm>
-              <a:off x="12560641" y="19617771"/>
+              <a:off x="11311116" y="19609987"/>
               <a:ext cx="1892300" cy="872954"/>
             </a:xfrm>
             <a:prstGeom prst="rect">
@@ -4316,7 +4271,7 @@
           </p:nvSpPr>
           <p:spPr>
             <a:xfrm>
-              <a:off x="14566118" y="19602970"/>
+              <a:off x="13316593" y="19595186"/>
               <a:ext cx="1892300" cy="887755"/>
             </a:xfrm>
             <a:prstGeom prst="rect">
@@ -4396,7 +4351,7 @@
           </p:nvSpPr>
           <p:spPr>
             <a:xfrm>
-              <a:off x="12560641" y="20582845"/>
+              <a:off x="11311116" y="20575061"/>
               <a:ext cx="1892300" cy="872954"/>
             </a:xfrm>
             <a:prstGeom prst="rect">
@@ -4473,8 +4428,8 @@
           </p:nvSpPr>
           <p:spPr>
             <a:xfrm>
-              <a:off x="12560642" y="21547919"/>
-              <a:ext cx="1892300" cy="683286"/>
+              <a:off x="9332841" y="19594377"/>
+              <a:ext cx="1892300" cy="887754"/>
             </a:xfrm>
             <a:prstGeom prst="rect">
               <a:avLst/>
@@ -4534,7 +4489,7 @@
           </p:nvSpPr>
           <p:spPr>
             <a:xfrm>
-              <a:off x="14586710" y="20582845"/>
+              <a:off x="13337185" y="20575061"/>
               <a:ext cx="1892300" cy="877206"/>
             </a:xfrm>
             <a:prstGeom prst="rect">
@@ -4593,13 +4548,14 @@
           </p:cNvPr>
           <p:cNvCxnSpPr>
             <a:cxnSpLocks/>
+            <a:endCxn id="32" idx="0"/>
           </p:cNvCxnSpPr>
           <p:nvPr/>
         </p:nvCxnSpPr>
         <p:spPr>
           <a:xfrm>
-            <a:off x="11512537" y="16335877"/>
-            <a:ext cx="0" cy="1435416"/>
+            <a:off x="10361175" y="16336543"/>
+            <a:ext cx="0" cy="1555727"/>
           </a:xfrm>
           <a:prstGeom prst="straightConnector1">
             <a:avLst/>
@@ -4979,10 +4935,10 @@
         </p:nvGrpSpPr>
         <p:grpSpPr>
           <a:xfrm>
-            <a:off x="17581431" y="8930640"/>
-            <a:ext cx="4928048" cy="6006425"/>
-            <a:chOff x="24593919" y="8993921"/>
-            <a:chExt cx="2932623" cy="6006425"/>
+            <a:off x="17300722" y="10438253"/>
+            <a:ext cx="3893469" cy="6006425"/>
+            <a:chOff x="24719397" y="8993921"/>
+            <a:chExt cx="2316957" cy="6006425"/>
           </a:xfrm>
         </p:grpSpPr>
         <p:grpSp>
@@ -4999,10 +4955,10 @@
           </p:nvGrpSpPr>
           <p:grpSpPr>
             <a:xfrm>
-              <a:off x="24593919" y="8993921"/>
-              <a:ext cx="2932623" cy="6006425"/>
-              <a:chOff x="25828611" y="14722471"/>
-              <a:chExt cx="2932623" cy="6006425"/>
+              <a:off x="24719397" y="8993921"/>
+              <a:ext cx="2316957" cy="6006425"/>
+              <a:chOff x="25954089" y="14722471"/>
+              <a:chExt cx="2316957" cy="6006425"/>
             </a:xfrm>
           </p:grpSpPr>
           <p:sp>
@@ -5019,8 +4975,8 @@
             </p:nvSpPr>
             <p:spPr>
               <a:xfrm>
-                <a:off x="25828611" y="14722471"/>
-                <a:ext cx="2932623" cy="6006425"/>
+                <a:off x="25954089" y="14722471"/>
+                <a:ext cx="2316957" cy="6006425"/>
               </a:xfrm>
               <a:prstGeom prst="rect">
                 <a:avLst/>
@@ -5073,7 +5029,7 @@
             <p:spPr>
               <a:xfrm>
                 <a:off x="26158498" y="15529245"/>
-                <a:ext cx="2272849" cy="1172175"/>
+                <a:ext cx="1932898" cy="1172175"/>
               </a:xfrm>
               <a:prstGeom prst="rect">
                 <a:avLst/>
@@ -5142,8 +5098,8 @@
           </p:nvSpPr>
           <p:spPr>
             <a:xfrm>
-              <a:off x="24962727" y="13429457"/>
-              <a:ext cx="2272850" cy="1182944"/>
+              <a:off x="24962727" y="13536137"/>
+              <a:ext cx="1893976" cy="1182944"/>
             </a:xfrm>
             <a:prstGeom prst="rect">
               <a:avLst/>
@@ -5327,8 +5283,8 @@
         </p:nvCxnSpPr>
         <p:spPr>
           <a:xfrm flipV="1">
-            <a:off x="21168360" y="10949837"/>
-            <a:ext cx="0" cy="2416339"/>
+            <a:off x="20214607" y="12417203"/>
+            <a:ext cx="0" cy="2563266"/>
           </a:xfrm>
           <a:prstGeom prst="straightConnector1">
             <a:avLst/>
@@ -5368,17 +5324,18 @@
           <p:cNvCxnSpPr>
             <a:cxnSpLocks/>
             <a:stCxn id="99" idx="3"/>
-            <a:endCxn id="160" idx="2"/>
           </p:cNvCxnSpPr>
           <p:nvPr/>
         </p:nvCxnSpPr>
         <p:spPr>
-          <a:xfrm flipV="1">
-            <a:off x="15543392" y="14549120"/>
-            <a:ext cx="4567468" cy="1041400"/>
+          <a:xfrm>
+            <a:off x="15543392" y="15590520"/>
+            <a:ext cx="2166223" cy="12700"/>
           </a:xfrm>
-          <a:prstGeom prst="bentConnector2">
-            <a:avLst/>
+          <a:prstGeom prst="bentConnector3">
+            <a:avLst>
+              <a:gd name="adj1" fmla="val 50000"/>
+            </a:avLst>
           </a:prstGeom>
           <a:ln w="76200">
             <a:solidFill>
@@ -5712,7 +5669,7 @@
         </p:nvSpPr>
         <p:spPr>
           <a:xfrm>
-            <a:off x="18201185" y="11626414"/>
+            <a:off x="17644211" y="13093779"/>
             <a:ext cx="2015233" cy="1378856"/>
           </a:xfrm>
           <a:prstGeom prst="rect">
@@ -5775,7 +5732,7 @@
         </p:nvCxnSpPr>
         <p:spPr>
           <a:xfrm flipV="1">
-            <a:off x="19197963" y="10949837"/>
+            <a:off x="18640989" y="12417202"/>
             <a:ext cx="0" cy="676577"/>
           </a:xfrm>
           <a:prstGeom prst="straightConnector1">
@@ -5804,6 +5761,164 @@
           </a:fontRef>
         </p:style>
       </p:cxnSp>
+      <p:cxnSp>
+        <p:nvCxnSpPr>
+          <p:cNvPr id="72" name="Straight Arrow Connector 71">
+            <a:extLst>
+              <a:ext uri="{FF2B5EF4-FFF2-40B4-BE49-F238E27FC236}">
+                <a16:creationId xmlns:a16="http://schemas.microsoft.com/office/drawing/2014/main" id="{EFDA15DE-E009-4849-A75D-6CC7FBCDBDD3}"/>
+              </a:ext>
+            </a:extLst>
+          </p:cNvPr>
+          <p:cNvCxnSpPr>
+            <a:cxnSpLocks/>
+          </p:cNvCxnSpPr>
+          <p:nvPr/>
+        </p:nvCxnSpPr>
+        <p:spPr>
+          <a:xfrm flipV="1">
+            <a:off x="7275831" y="16300680"/>
+            <a:ext cx="0" cy="1555727"/>
+          </a:xfrm>
+          <a:prstGeom prst="straightConnector1">
+            <a:avLst/>
+          </a:prstGeom>
+          <a:ln w="76200">
+            <a:solidFill>
+              <a:schemeClr val="tx1"/>
+            </a:solidFill>
+            <a:tailEnd type="triangle"/>
+          </a:ln>
+        </p:spPr>
+        <p:style>
+          <a:lnRef idx="1">
+            <a:schemeClr val="accent1"/>
+          </a:lnRef>
+          <a:fillRef idx="0">
+            <a:schemeClr val="accent1"/>
+          </a:fillRef>
+          <a:effectRef idx="0">
+            <a:schemeClr val="accent1"/>
+          </a:effectRef>
+          <a:fontRef idx="minor">
+            <a:schemeClr val="tx1"/>
+          </a:fontRef>
+        </p:style>
+      </p:cxnSp>
+      <p:cxnSp>
+        <p:nvCxnSpPr>
+          <p:cNvPr id="75" name="Straight Arrow Connector 74">
+            <a:extLst>
+              <a:ext uri="{FF2B5EF4-FFF2-40B4-BE49-F238E27FC236}">
+                <a16:creationId xmlns:a16="http://schemas.microsoft.com/office/drawing/2014/main" id="{00065573-B2EC-4D75-8A9C-8BD8C9A099DE}"/>
+              </a:ext>
+            </a:extLst>
+          </p:cNvPr>
+          <p:cNvCxnSpPr>
+            <a:cxnSpLocks/>
+            <a:stCxn id="36" idx="0"/>
+            <a:endCxn id="80" idx="2"/>
+          </p:cNvCxnSpPr>
+          <p:nvPr/>
+        </p:nvCxnSpPr>
+        <p:spPr>
+          <a:xfrm rot="16200000" flipV="1">
+            <a:off x="11598843" y="16175602"/>
+            <a:ext cx="1573661" cy="1836318"/>
+          </a:xfrm>
+          <a:prstGeom prst="bentConnector3">
+            <a:avLst>
+              <a:gd name="adj1" fmla="val 23852"/>
+            </a:avLst>
+          </a:prstGeom>
+          <a:ln w="76200">
+            <a:solidFill>
+              <a:schemeClr val="tx1"/>
+            </a:solidFill>
+            <a:tailEnd type="triangle"/>
+          </a:ln>
+        </p:spPr>
+        <p:style>
+          <a:lnRef idx="1">
+            <a:schemeClr val="accent1"/>
+          </a:lnRef>
+          <a:fillRef idx="0">
+            <a:schemeClr val="accent1"/>
+          </a:fillRef>
+          <a:effectRef idx="0">
+            <a:schemeClr val="accent1"/>
+          </a:effectRef>
+          <a:fontRef idx="minor">
+            <a:schemeClr val="tx1"/>
+          </a:fontRef>
+        </p:style>
+      </p:cxnSp>
+      <p:sp>
+        <p:nvSpPr>
+          <p:cNvPr id="80" name="Rectangle 79">
+            <a:extLst>
+              <a:ext uri="{FF2B5EF4-FFF2-40B4-BE49-F238E27FC236}">
+                <a16:creationId xmlns:a16="http://schemas.microsoft.com/office/drawing/2014/main" id="{F3F180BC-0870-4663-ADBD-5AC90D62749D}"/>
+              </a:ext>
+            </a:extLst>
+          </p:cNvPr>
+          <p:cNvSpPr/>
+          <p:nvPr/>
+        </p:nvSpPr>
+        <p:spPr>
+          <a:xfrm>
+            <a:off x="11095875" y="15742925"/>
+            <a:ext cx="743278" cy="564005"/>
+          </a:xfrm>
+          <a:prstGeom prst="rect">
+            <a:avLst/>
+          </a:prstGeom>
+          <a:solidFill>
+            <a:srgbClr val="FF0000"/>
+          </a:solidFill>
+          <a:ln>
+            <a:solidFill>
+              <a:srgbClr val="FF0000"/>
+            </a:solidFill>
+          </a:ln>
+        </p:spPr>
+        <p:style>
+          <a:lnRef idx="2">
+            <a:schemeClr val="accent4">
+              <a:shade val="50000"/>
+            </a:schemeClr>
+          </a:lnRef>
+          <a:fillRef idx="1">
+            <a:schemeClr val="accent4"/>
+          </a:fillRef>
+          <a:effectRef idx="0">
+            <a:schemeClr val="accent4"/>
+          </a:effectRef>
+          <a:fontRef idx="minor">
+            <a:schemeClr val="lt1"/>
+          </a:fontRef>
+        </p:style>
+        <p:txBody>
+          <a:bodyPr rtlCol="0" anchor="ctr"/>
+          <a:lstStyle/>
+          <a:p>
+            <a:pPr algn="ctr"/>
+            <a:endParaRPr lang="en-GB" sz="2500" dirty="0">
+              <a:ln w="0"/>
+              <a:solidFill>
+                <a:schemeClr val="tx1"/>
+              </a:solidFill>
+              <a:effectLst>
+                <a:outerShdw blurRad="38100" dist="19050" dir="2700000" algn="tl" rotWithShape="0">
+                  <a:schemeClr val="dk1">
+                    <a:alpha val="40000"/>
+                  </a:schemeClr>
+                </a:outerShdw>
+              </a:effectLst>
+            </a:endParaRPr>
+          </a:p>
+        </p:txBody>
+      </p:sp>
     </p:spTree>
     <p:extLst>
       <p:ext uri="{BB962C8B-B14F-4D97-AF65-F5344CB8AC3E}">

</xml_diff>